<commit_message>
new eap overview and details - draft 1
</commit_message>
<xml_diff>
--- a/08_Project_management/WGM Reports/5th_WGM/AO10649_ePO_WGM5_20180328_v1.pptx
+++ b/08_Project_management/WGM Reports/5th_WGM/AO10649_ePO_WGM5_20180328_v1.pptx
@@ -19,7 +19,7 @@
     <p:sldId id="332" r:id="rId10"/>
     <p:sldId id="357" r:id="rId11"/>
     <p:sldId id="359" r:id="rId12"/>
-    <p:sldId id="358" r:id="rId13"/>
+    <p:sldId id="360" r:id="rId13"/>
     <p:sldId id="354" r:id="rId14"/>
   </p:sldIdLst>
   <p:sldSz cx="9144000" cy="6858000" type="screen4x3"/>
@@ -4327,6 +4327,90 @@
 </p:notes>
 </file>
 
+<file path=ppt/notesSlides/notesSlide3.xml><?xml version="1.0" encoding="utf-8"?>
+<p:notes xmlns:a="http://schemas.openxmlformats.org/drawingml/2006/main" xmlns:r="http://schemas.openxmlformats.org/officeDocument/2006/relationships" xmlns:p="http://schemas.openxmlformats.org/presentationml/2006/main">
+  <p:cSld>
+    <p:spTree>
+      <p:nvGrpSpPr>
+        <p:cNvPr id="1" name=""/>
+        <p:cNvGrpSpPr/>
+        <p:nvPr/>
+      </p:nvGrpSpPr>
+      <p:grpSpPr>
+        <a:xfrm>
+          <a:off x="0" y="0"/>
+          <a:ext cx="0" cy="0"/>
+          <a:chOff x="0" y="0"/>
+          <a:chExt cx="0" cy="0"/>
+        </a:xfrm>
+      </p:grpSpPr>
+      <p:sp>
+        <p:nvSpPr>
+          <p:cNvPr id="2" name="Marcador de imagen de diapositiva 1"/>
+          <p:cNvSpPr>
+            <a:spLocks noGrp="1" noRot="1" noChangeAspect="1"/>
+          </p:cNvSpPr>
+          <p:nvPr>
+            <p:ph type="sldImg"/>
+          </p:nvPr>
+        </p:nvSpPr>
+        <p:spPr/>
+      </p:sp>
+      <p:sp>
+        <p:nvSpPr>
+          <p:cNvPr id="3" name="Marcador de notas 2"/>
+          <p:cNvSpPr>
+            <a:spLocks noGrp="1"/>
+          </p:cNvSpPr>
+          <p:nvPr>
+            <p:ph type="body" idx="1"/>
+          </p:nvPr>
+        </p:nvSpPr>
+        <p:spPr/>
+        <p:txBody>
+          <a:bodyPr/>
+          <a:lstStyle/>
+          <a:p>
+            <a:endParaRPr lang="es-ES" dirty="0"/>
+          </a:p>
+        </p:txBody>
+      </p:sp>
+      <p:sp>
+        <p:nvSpPr>
+          <p:cNvPr id="4" name="Marcador de número de diapositiva 3"/>
+          <p:cNvSpPr>
+            <a:spLocks noGrp="1"/>
+          </p:cNvSpPr>
+          <p:nvPr>
+            <p:ph type="sldNum" sz="quarter" idx="10"/>
+          </p:nvPr>
+        </p:nvSpPr>
+        <p:spPr/>
+        <p:txBody>
+          <a:bodyPr/>
+          <a:lstStyle/>
+          <a:p>
+            <a:fld id="{1CB81651-EBBD-46D2-9860-19D52AC33014}" type="slidenum">
+              <a:rPr lang="en-US" smtClean="0"/>
+              <a:t>9</a:t>
+            </a:fld>
+            <a:endParaRPr lang="en-US"/>
+          </a:p>
+        </p:txBody>
+      </p:sp>
+    </p:spTree>
+    <p:extLst>
+      <p:ext uri="{BB962C8B-B14F-4D97-AF65-F5344CB8AC3E}">
+        <p14:creationId xmlns:p14="http://schemas.microsoft.com/office/powerpoint/2010/main" val="1285361043"/>
+      </p:ext>
+    </p:extLst>
+  </p:cSld>
+  <p:clrMapOvr>
+    <a:masterClrMapping/>
+  </p:clrMapOvr>
+</p:notes>
+</file>
+
 <file path=ppt/slideLayouts/slideLayout1.xml><?xml version="1.0" encoding="utf-8"?>
 <p:sldLayout xmlns:a="http://schemas.openxmlformats.org/drawingml/2006/main" xmlns:r="http://schemas.openxmlformats.org/officeDocument/2006/relationships" xmlns:p="http://schemas.openxmlformats.org/presentationml/2006/main" preserve="1" userDrawn="1">
   <p:cSld name="Title Slide">
@@ -9970,6 +10054,30 @@
           <a:chExt cx="0" cy="0"/>
         </a:xfrm>
       </p:grpSpPr>
+      <p:pic>
+        <p:nvPicPr>
+          <p:cNvPr id="15" name="Imagen 14"/>
+          <p:cNvPicPr>
+            <a:picLocks noChangeAspect="1"/>
+          </p:cNvPicPr>
+          <p:nvPr/>
+        </p:nvPicPr>
+        <p:blipFill>
+          <a:blip r:embed="rId2"/>
+          <a:stretch>
+            <a:fillRect/>
+          </a:stretch>
+        </p:blipFill>
+        <p:spPr>
+          <a:xfrm>
+            <a:off x="323226" y="2267027"/>
+            <a:ext cx="4356228" cy="4145658"/>
+          </a:xfrm>
+          <a:prstGeom prst="rect">
+            <a:avLst/>
+          </a:prstGeom>
+        </p:spPr>
+      </p:pic>
       <p:sp>
         <p:nvSpPr>
           <p:cNvPr id="4" name="Marcador de número de diapositiva 3"/>
@@ -10212,33 +10320,369 @@
             </a:lvl9pPr>
           </a:lstStyle>
           <a:p>
-            <a:pPr marL="285750" indent="-285750" fontAlgn="auto">
-              <a:spcAft>
-                <a:spcPts val="0"/>
-              </a:spcAft>
-              <a:buFont typeface="Arial" panose="020B0604020202020204" pitchFamily="34" charset="0"/>
-              <a:buChar char="•"/>
-              <a:defRPr/>
-            </a:pPr>
-            <a:r>
-              <a:rPr lang="en-US" b="0" dirty="0" err="1" smtClean="0">
-                <a:sym typeface="Wingdings" panose="05000000000000000000" pitchFamily="2" charset="2"/>
-              </a:rPr>
-              <a:t>Bla</a:t>
-            </a:r>
-            <a:endParaRPr lang="en-US" dirty="0" smtClean="0">
-              <a:sym typeface="Wingdings" panose="05000000000000000000" pitchFamily="2" charset="2"/>
-            </a:endParaRPr>
-          </a:p>
-          <a:p>
-            <a:pPr marL="800100" lvl="1" indent="-285750">
-              <a:buFont typeface="Arial" panose="020B0604020202020204" pitchFamily="34" charset="0"/>
-              <a:buChar char="•"/>
+            <a:pPr marL="514350" lvl="1" indent="0">
+              <a:buNone/>
               <a:defRPr/>
             </a:pPr>
             <a:endParaRPr lang="en-US" b="0" dirty="0" smtClean="0">
               <a:sym typeface="Wingdings" panose="05000000000000000000" pitchFamily="2" charset="2"/>
             </a:endParaRPr>
+          </a:p>
+        </p:txBody>
+      </p:sp>
+      <p:sp>
+        <p:nvSpPr>
+          <p:cNvPr id="14" name="CuadroTexto 13"/>
+          <p:cNvSpPr txBox="1"/>
+          <p:nvPr/>
+        </p:nvSpPr>
+        <p:spPr>
+          <a:xfrm>
+            <a:off x="546847" y="1775012"/>
+            <a:ext cx="8184777" cy="1600438"/>
+          </a:xfrm>
+          <a:prstGeom prst="rect">
+            <a:avLst/>
+          </a:prstGeom>
+          <a:solidFill>
+            <a:schemeClr val="bg1"/>
+          </a:solidFill>
+        </p:spPr>
+        <p:txBody>
+          <a:bodyPr wrap="square" rtlCol="0">
+            <a:spAutoFit/>
+          </a:bodyPr>
+          <a:lstStyle/>
+          <a:p>
+            <a:r>
+              <a:rPr lang="es-ES" sz="1400" b="1" dirty="0" err="1" smtClean="0"/>
+              <a:t>Objectives</a:t>
+            </a:r>
+            <a:r>
+              <a:rPr lang="es-ES" sz="1400" b="1" dirty="0" smtClean="0"/>
+              <a:t> </a:t>
+            </a:r>
+            <a:r>
+              <a:rPr lang="es-ES" sz="1400" b="1" dirty="0" err="1" smtClean="0"/>
+              <a:t>for</a:t>
+            </a:r>
+            <a:r>
+              <a:rPr lang="es-ES" sz="1400" b="1" dirty="0" smtClean="0"/>
+              <a:t> </a:t>
+            </a:r>
+            <a:r>
+              <a:rPr lang="es-ES" sz="1400" b="1" dirty="0" err="1" smtClean="0"/>
+              <a:t>the</a:t>
+            </a:r>
+            <a:r>
+              <a:rPr lang="es-ES" sz="1400" b="1" dirty="0" smtClean="0"/>
+              <a:t> WG </a:t>
+            </a:r>
+            <a:r>
+              <a:rPr lang="es-ES" sz="1400" b="1" dirty="0" err="1" smtClean="0"/>
+              <a:t>members</a:t>
+            </a:r>
+            <a:r>
+              <a:rPr lang="es-ES" sz="1400" dirty="0" smtClean="0"/>
+              <a:t>: </a:t>
+            </a:r>
+          </a:p>
+          <a:p>
+            <a:endParaRPr lang="es-ES" sz="1400" dirty="0" smtClean="0"/>
+          </a:p>
+          <a:p>
+            <a:pPr marL="342900" indent="-342900">
+              <a:buFontTx/>
+              <a:buAutoNum type="arabicPeriod"/>
+            </a:pPr>
+            <a:r>
+              <a:rPr lang="es-ES" sz="1400" dirty="0" err="1"/>
+              <a:t>Review</a:t>
+            </a:r>
+            <a:r>
+              <a:rPr lang="es-ES" sz="1400" dirty="0"/>
+              <a:t> </a:t>
+            </a:r>
+            <a:r>
+              <a:rPr lang="es-ES" sz="1400" dirty="0" err="1"/>
+              <a:t>completeness</a:t>
+            </a:r>
+            <a:endParaRPr lang="es-ES" sz="1400" dirty="0"/>
+          </a:p>
+          <a:p>
+            <a:pPr marL="342900" indent="-342900">
+              <a:buAutoNum type="arabicPeriod"/>
+            </a:pPr>
+            <a:r>
+              <a:rPr lang="es-ES" sz="1400" dirty="0" err="1" smtClean="0"/>
+              <a:t>Review</a:t>
+            </a:r>
+            <a:r>
+              <a:rPr lang="es-ES" sz="1400" dirty="0" smtClean="0"/>
+              <a:t> </a:t>
+            </a:r>
+            <a:r>
+              <a:rPr lang="es-ES" sz="1400" dirty="0" err="1" smtClean="0"/>
+              <a:t>coherence</a:t>
+            </a:r>
+            <a:endParaRPr lang="es-ES" sz="1400" dirty="0" smtClean="0"/>
+          </a:p>
+          <a:p>
+            <a:pPr marL="342900" indent="-342900">
+              <a:buAutoNum type="arabicPeriod"/>
+            </a:pPr>
+            <a:r>
+              <a:rPr lang="es-ES" sz="1400" dirty="0" err="1" smtClean="0"/>
+              <a:t>Issue</a:t>
+            </a:r>
+            <a:r>
+              <a:rPr lang="es-ES" sz="1400" dirty="0" smtClean="0"/>
+              <a:t> </a:t>
+            </a:r>
+            <a:r>
+              <a:rPr lang="es-ES" sz="1400" dirty="0" err="1" smtClean="0"/>
+              <a:t>considerations</a:t>
+            </a:r>
+            <a:r>
+              <a:rPr lang="es-ES" sz="1400" dirty="0" smtClean="0"/>
+              <a:t> </a:t>
+            </a:r>
+            <a:r>
+              <a:rPr lang="es-ES" sz="1400" dirty="0" err="1" smtClean="0"/>
+              <a:t>on</a:t>
+            </a:r>
+            <a:r>
+              <a:rPr lang="es-ES" sz="1400" dirty="0" smtClean="0"/>
+              <a:t> </a:t>
+            </a:r>
+            <a:r>
+              <a:rPr lang="es-ES" sz="1400" dirty="0" err="1" smtClean="0"/>
+              <a:t>desing</a:t>
+            </a:r>
+            <a:r>
+              <a:rPr lang="es-ES" sz="1400" dirty="0" smtClean="0"/>
+              <a:t> </a:t>
+            </a:r>
+            <a:r>
+              <a:rPr lang="es-ES" sz="1400" dirty="0" err="1" smtClean="0"/>
+              <a:t>aspects</a:t>
+            </a:r>
+            <a:r>
+              <a:rPr lang="es-ES" sz="1400" dirty="0" smtClean="0"/>
+              <a:t> </a:t>
+            </a:r>
+          </a:p>
+          <a:p>
+            <a:endParaRPr lang="es-ES" sz="1400" dirty="0" smtClean="0">
+              <a:sym typeface="Wingdings" panose="05000000000000000000" pitchFamily="2" charset="2"/>
+            </a:endParaRPr>
+          </a:p>
+          <a:p>
+            <a:endParaRPr lang="es-ES" sz="1400" dirty="0"/>
+          </a:p>
+        </p:txBody>
+      </p:sp>
+      <p:sp>
+        <p:nvSpPr>
+          <p:cNvPr id="17" name="Rectángulo 16"/>
+          <p:cNvSpPr/>
+          <p:nvPr/>
+        </p:nvSpPr>
+        <p:spPr>
+          <a:xfrm>
+            <a:off x="344039" y="6538913"/>
+            <a:ext cx="7044485" cy="261610"/>
+          </a:xfrm>
+          <a:prstGeom prst="rect">
+            <a:avLst/>
+          </a:prstGeom>
+        </p:spPr>
+        <p:txBody>
+          <a:bodyPr wrap="square">
+            <a:spAutoFit/>
+          </a:bodyPr>
+          <a:lstStyle/>
+          <a:p>
+            <a:r>
+              <a:rPr lang="es-ES" sz="1100" dirty="0">
+                <a:hlinkClick r:id="rId3"/>
+              </a:rPr>
+              <a:t>https://</a:t>
+            </a:r>
+            <a:r>
+              <a:rPr lang="es-ES" sz="1100" dirty="0" smtClean="0">
+                <a:hlinkClick r:id="rId3"/>
+              </a:rPr>
+              <a:t>github.com/eProcurement-everis/ePO/wiki/Conceptual-Model#classes</a:t>
+            </a:r>
+            <a:endParaRPr lang="es-ES" sz="1100" dirty="0"/>
+          </a:p>
+        </p:txBody>
+      </p:sp>
+      <p:sp>
+        <p:nvSpPr>
+          <p:cNvPr id="18" name="Rectángulo 17"/>
+          <p:cNvSpPr/>
+          <p:nvPr/>
+        </p:nvSpPr>
+        <p:spPr>
+          <a:xfrm>
+            <a:off x="969282" y="2896702"/>
+            <a:ext cx="3172409" cy="461665"/>
+          </a:xfrm>
+          <a:prstGeom prst="rect">
+            <a:avLst/>
+          </a:prstGeom>
+        </p:spPr>
+        <p:txBody>
+          <a:bodyPr wrap="square">
+            <a:spAutoFit/>
+          </a:bodyPr>
+          <a:lstStyle/>
+          <a:p>
+            <a:r>
+              <a:rPr lang="es-ES" sz="1200" dirty="0">
+                <a:sym typeface="Wingdings" panose="05000000000000000000" pitchFamily="2" charset="2"/>
+              </a:rPr>
+              <a:t> </a:t>
+            </a:r>
+            <a:r>
+              <a:rPr lang="es-ES" sz="1200" dirty="0" err="1">
+                <a:sym typeface="Wingdings" panose="05000000000000000000" pitchFamily="2" charset="2"/>
+              </a:rPr>
+              <a:t>Proposal</a:t>
+            </a:r>
+            <a:r>
+              <a:rPr lang="es-ES" sz="1200" dirty="0">
+                <a:sym typeface="Wingdings" panose="05000000000000000000" pitchFamily="2" charset="2"/>
+              </a:rPr>
+              <a:t>: regular </a:t>
+            </a:r>
+            <a:r>
+              <a:rPr lang="es-ES" sz="1200" dirty="0" err="1">
+                <a:sym typeface="Wingdings" panose="05000000000000000000" pitchFamily="2" charset="2"/>
+              </a:rPr>
+              <a:t>meetings</a:t>
+            </a:r>
+            <a:r>
+              <a:rPr lang="es-ES" sz="1200" dirty="0">
+                <a:sym typeface="Wingdings" panose="05000000000000000000" pitchFamily="2" charset="2"/>
+              </a:rPr>
+              <a:t> </a:t>
+            </a:r>
+            <a:r>
+              <a:rPr lang="es-ES" sz="1200" dirty="0" err="1">
+                <a:sym typeface="Wingdings" panose="05000000000000000000" pitchFamily="2" charset="2"/>
+              </a:rPr>
+              <a:t>with</a:t>
+            </a:r>
+            <a:r>
+              <a:rPr lang="es-ES" sz="1200" dirty="0">
+                <a:sym typeface="Wingdings" panose="05000000000000000000" pitchFamily="2" charset="2"/>
+              </a:rPr>
+              <a:t> </a:t>
+            </a:r>
+            <a:r>
+              <a:rPr lang="es-ES" sz="1200" dirty="0" err="1">
+                <a:sym typeface="Wingdings" panose="05000000000000000000" pitchFamily="2" charset="2"/>
+              </a:rPr>
+              <a:t>subgroup</a:t>
+            </a:r>
+            <a:r>
+              <a:rPr lang="es-ES" sz="1200" dirty="0">
+                <a:sym typeface="Wingdings" panose="05000000000000000000" pitchFamily="2" charset="2"/>
+              </a:rPr>
+              <a:t> of </a:t>
+            </a:r>
+            <a:r>
+              <a:rPr lang="es-ES" sz="1200" dirty="0" err="1">
+                <a:sym typeface="Wingdings" panose="05000000000000000000" pitchFamily="2" charset="2"/>
+              </a:rPr>
+              <a:t>technical</a:t>
+            </a:r>
+            <a:r>
+              <a:rPr lang="es-ES" sz="1200" dirty="0">
+                <a:sym typeface="Wingdings" panose="05000000000000000000" pitchFamily="2" charset="2"/>
+              </a:rPr>
+              <a:t> </a:t>
+            </a:r>
+            <a:r>
+              <a:rPr lang="es-ES" sz="1200" dirty="0" err="1">
+                <a:sym typeface="Wingdings" panose="05000000000000000000" pitchFamily="2" charset="2"/>
+              </a:rPr>
+              <a:t>experts</a:t>
+            </a:r>
+            <a:endParaRPr lang="es-ES" sz="1200" dirty="0"/>
+          </a:p>
+        </p:txBody>
+      </p:sp>
+      <p:pic>
+        <p:nvPicPr>
+          <p:cNvPr id="22" name="Imagen 21"/>
+          <p:cNvPicPr>
+            <a:picLocks noChangeAspect="1"/>
+          </p:cNvPicPr>
+          <p:nvPr/>
+        </p:nvPicPr>
+        <p:blipFill rotWithShape="1">
+          <a:blip r:embed="rId4"/>
+          <a:srcRect l="32027" b="25306"/>
+          <a:stretch/>
+        </p:blipFill>
+        <p:spPr>
+          <a:xfrm>
+            <a:off x="4599382" y="1187079"/>
+            <a:ext cx="4515217" cy="5122506"/>
+          </a:xfrm>
+          <a:prstGeom prst="rect">
+            <a:avLst/>
+          </a:prstGeom>
+        </p:spPr>
+      </p:pic>
+      <p:sp>
+        <p:nvSpPr>
+          <p:cNvPr id="16" name="Rectángulo redondeado 15"/>
+          <p:cNvSpPr/>
+          <p:nvPr/>
+        </p:nvSpPr>
+        <p:spPr>
+          <a:xfrm>
+            <a:off x="3460373" y="5747357"/>
+            <a:ext cx="1362636" cy="698023"/>
+          </a:xfrm>
+          <a:prstGeom prst="roundRect">
+            <a:avLst/>
+          </a:prstGeom>
+          <a:solidFill>
+            <a:schemeClr val="accent1">
+              <a:lumMod val="20000"/>
+              <a:lumOff val="80000"/>
+              <a:alpha val="0"/>
+            </a:schemeClr>
+          </a:solidFill>
+        </p:spPr>
+        <p:style>
+          <a:lnRef idx="2">
+            <a:schemeClr val="accent1">
+              <a:shade val="50000"/>
+            </a:schemeClr>
+          </a:lnRef>
+          <a:fillRef idx="1">
+            <a:schemeClr val="accent1"/>
+          </a:fillRef>
+          <a:effectRef idx="0">
+            <a:schemeClr val="accent1"/>
+          </a:effectRef>
+          <a:fontRef idx="minor">
+            <a:schemeClr val="lt1"/>
+          </a:fontRef>
+        </p:style>
+        <p:txBody>
+          <a:bodyPr rtlCol="0" anchor="ctr"/>
+          <a:lstStyle/>
+          <a:p>
+            <a:pPr algn="ctr"/>
+            <a:endParaRPr lang="es-ES"/>
           </a:p>
         </p:txBody>
       </p:sp>
@@ -10780,7 +11224,11 @@
             </a:pPr>
             <a:r>
               <a:rPr lang="en-US" dirty="0" smtClean="0"/>
-              <a:t>3. Preparation of the </a:t>
+              <a:t>3. </a:t>
+            </a:r>
+            <a:r>
+              <a:rPr lang="en-US" dirty="0" smtClean="0"/>
+              <a:t>Preparation of the </a:t>
             </a:r>
             <a:r>
               <a:rPr lang="en-US" dirty="0" err="1" smtClean="0"/>
@@ -11021,7 +11469,7 @@
         </p:blipFill>
         <p:spPr>
           <a:xfrm>
-            <a:off x="1394564" y="1642997"/>
+            <a:off x="1663504" y="1642997"/>
             <a:ext cx="5852851" cy="5016730"/>
           </a:xfrm>
           <a:prstGeom prst="rect">
@@ -11037,7 +11485,7 @@
         </p:nvSpPr>
         <p:spPr>
           <a:xfrm>
-            <a:off x="1299879" y="6625261"/>
+            <a:off x="1568819" y="6625261"/>
             <a:ext cx="6229351" cy="415498"/>
           </a:xfrm>
           <a:prstGeom prst="rect">
@@ -11744,8 +12192,8 @@
         </p:nvSpPr>
         <p:spPr>
           <a:xfrm>
-            <a:off x="195263" y="1844674"/>
-            <a:ext cx="8696325" cy="4876801"/>
+            <a:off x="7053263" y="1387299"/>
+            <a:ext cx="1770697" cy="283906"/>
           </a:xfrm>
           <a:prstGeom prst="rect">
             <a:avLst/>
@@ -11753,7 +12201,7 @@
         </p:spPr>
         <p:txBody>
           <a:bodyPr>
-            <a:normAutofit/>
+            <a:normAutofit fontScale="85000" lnSpcReduction="20000"/>
           </a:bodyPr>
           <a:lstStyle>
             <a:lvl1pPr marL="514350" indent="-514350" algn="l" defTabSz="914400" rtl="0" eaLnBrk="1" latinLnBrk="0" hangingPunct="1">
@@ -11919,49 +12367,138 @@
               <a:rPr lang="en-US" dirty="0" smtClean="0">
                 <a:sym typeface="Wingdings" panose="05000000000000000000" pitchFamily="2" charset="2"/>
               </a:rPr>
-              <a:t> information retrieval</a:t>
-            </a:r>
-          </a:p>
-          <a:p>
-            <a:pPr marL="0" indent="0" fontAlgn="auto">
-              <a:spcAft>
-                <a:spcPts val="0"/>
-              </a:spcAft>
-              <a:buNone/>
-              <a:defRPr/>
-            </a:pPr>
-            <a:endParaRPr lang="es-ES" b="0" dirty="0">
-              <a:sym typeface="Wingdings" panose="05000000000000000000" pitchFamily="2" charset="2"/>
-            </a:endParaRPr>
-          </a:p>
-          <a:p>
-            <a:pPr marL="0" indent="0" fontAlgn="auto">
-              <a:spcAft>
-                <a:spcPts val="0"/>
-              </a:spcAft>
-              <a:buNone/>
-              <a:defRPr/>
-            </a:pPr>
-            <a:endParaRPr lang="en-US" dirty="0" smtClean="0">
-              <a:sym typeface="Wingdings" panose="05000000000000000000" pitchFamily="2" charset="2"/>
-            </a:endParaRPr>
-          </a:p>
-          <a:p>
-            <a:pPr marL="800100" lvl="1" indent="-285750">
-              <a:buFont typeface="Arial" panose="020B0604020202020204" pitchFamily="34" charset="0"/>
-              <a:buChar char="•"/>
-              <a:defRPr/>
-            </a:pPr>
+              <a:t> Deadline</a:t>
+            </a:r>
             <a:endParaRPr lang="en-US" b="0" dirty="0" smtClean="0">
               <a:sym typeface="Wingdings" panose="05000000000000000000" pitchFamily="2" charset="2"/>
             </a:endParaRPr>
+          </a:p>
+        </p:txBody>
+      </p:sp>
+      <p:pic>
+        <p:nvPicPr>
+          <p:cNvPr id="3" name="Imagen 2"/>
+          <p:cNvPicPr>
+            <a:picLocks noChangeAspect="1"/>
+          </p:cNvPicPr>
+          <p:nvPr/>
+        </p:nvPicPr>
+        <p:blipFill>
+          <a:blip r:embed="rId3">
+            <a:extLst>
+              <a:ext uri="{28A0092B-C50C-407E-A947-70E740481C1C}">
+                <a14:useLocalDpi xmlns:a14="http://schemas.microsoft.com/office/drawing/2010/main" val="0"/>
+              </a:ext>
+            </a:extLst>
+          </a:blip>
+          <a:stretch>
+            <a:fillRect/>
+          </a:stretch>
+        </p:blipFill>
+        <p:spPr>
+          <a:xfrm>
+            <a:off x="17930" y="1801230"/>
+            <a:ext cx="9144000" cy="4765686"/>
+          </a:xfrm>
+          <a:prstGeom prst="rect">
+            <a:avLst/>
+          </a:prstGeom>
+        </p:spPr>
+      </p:pic>
+      <p:sp>
+        <p:nvSpPr>
+          <p:cNvPr id="13" name="Rectángulo redondeado 12"/>
+          <p:cNvSpPr/>
+          <p:nvPr/>
+        </p:nvSpPr>
+        <p:spPr>
+          <a:xfrm>
+            <a:off x="3720354" y="5217459"/>
+            <a:ext cx="5316071" cy="484094"/>
+          </a:xfrm>
+          <a:prstGeom prst="roundRect">
+            <a:avLst/>
+          </a:prstGeom>
+          <a:solidFill>
+            <a:schemeClr val="accent1">
+              <a:alpha val="22000"/>
+            </a:schemeClr>
+          </a:solidFill>
+        </p:spPr>
+        <p:style>
+          <a:lnRef idx="2">
+            <a:schemeClr val="accent1">
+              <a:shade val="50000"/>
+            </a:schemeClr>
+          </a:lnRef>
+          <a:fillRef idx="1">
+            <a:schemeClr val="accent1"/>
+          </a:fillRef>
+          <a:effectRef idx="0">
+            <a:schemeClr val="accent1"/>
+          </a:effectRef>
+          <a:fontRef idx="minor">
+            <a:schemeClr val="lt1"/>
+          </a:fontRef>
+        </p:style>
+        <p:txBody>
+          <a:bodyPr rtlCol="0" anchor="ctr"/>
+          <a:lstStyle/>
+          <a:p>
+            <a:pPr algn="ctr"/>
+            <a:endParaRPr lang="es-ES"/>
+          </a:p>
+        </p:txBody>
+      </p:sp>
+      <p:sp>
+        <p:nvSpPr>
+          <p:cNvPr id="15" name="Rectángulo redondeado 14"/>
+          <p:cNvSpPr/>
+          <p:nvPr/>
+        </p:nvSpPr>
+        <p:spPr>
+          <a:xfrm>
+            <a:off x="3738283" y="4242980"/>
+            <a:ext cx="5316071" cy="633821"/>
+          </a:xfrm>
+          <a:prstGeom prst="roundRect">
+            <a:avLst/>
+          </a:prstGeom>
+          <a:solidFill>
+            <a:schemeClr val="accent1">
+              <a:alpha val="22000"/>
+            </a:schemeClr>
+          </a:solidFill>
+        </p:spPr>
+        <p:style>
+          <a:lnRef idx="2">
+            <a:schemeClr val="accent1">
+              <a:shade val="50000"/>
+            </a:schemeClr>
+          </a:lnRef>
+          <a:fillRef idx="1">
+            <a:schemeClr val="accent1"/>
+          </a:fillRef>
+          <a:effectRef idx="0">
+            <a:schemeClr val="accent1"/>
+          </a:effectRef>
+          <a:fontRef idx="minor">
+            <a:schemeClr val="lt1"/>
+          </a:fontRef>
+        </p:style>
+        <p:txBody>
+          <a:bodyPr rtlCol="0" anchor="ctr"/>
+          <a:lstStyle/>
+          <a:p>
+            <a:pPr algn="ctr"/>
+            <a:endParaRPr lang="es-ES"/>
           </a:p>
         </p:txBody>
       </p:sp>
     </p:spTree>
     <p:extLst>
       <p:ext uri="{BB962C8B-B14F-4D97-AF65-F5344CB8AC3E}">
-        <p14:creationId xmlns:p14="http://schemas.microsoft.com/office/powerpoint/2010/main" val="1462767639"/>
+        <p14:creationId xmlns:p14="http://schemas.microsoft.com/office/powerpoint/2010/main" val="1527651461"/>
       </p:ext>
     </p:extLst>
   </p:cSld>

</xml_diff>